<commit_message>
Combined slides in 1st pitch
</commit_message>
<xml_diff>
--- a/Planning/1stPitch.pptx
+++ b/Planning/1stPitch.pptx
@@ -7,12 +7,12 @@
   <p:sldIdLst>
     <p:sldId id="261" r:id="rId2"/>
     <p:sldId id="263" r:id="rId3"/>
-    <p:sldId id="262" r:id="rId4"/>
-    <p:sldId id="256" r:id="rId5"/>
-    <p:sldId id="257" r:id="rId6"/>
-    <p:sldId id="258" r:id="rId7"/>
-    <p:sldId id="259" r:id="rId8"/>
-    <p:sldId id="264" r:id="rId9"/>
+    <p:sldId id="257" r:id="rId4"/>
+    <p:sldId id="265" r:id="rId5"/>
+    <p:sldId id="266" r:id="rId6"/>
+    <p:sldId id="264" r:id="rId7"/>
+    <p:sldId id="258" r:id="rId8"/>
+    <p:sldId id="259" r:id="rId9"/>
   </p:sldIdLst>
   <p:sldSz cx="12192000" cy="6858000"/>
   <p:notesSz cx="6858000" cy="9144000"/>
@@ -4395,7 +4395,7 @@
           <a:p>
             <a:fld id="{48A87A34-81AB-432B-8DAE-1953F412C126}" type="datetimeFigureOut">
               <a:rPr lang="en-US" dirty="0"/>
-              <a:t>3/1/2016</a:t>
+              <a:t>3/2/2016</a:t>
             </a:fld>
             <a:endParaRPr lang="en-US" dirty="0"/>
           </a:p>
@@ -4657,7 +4657,7 @@
           <a:p>
             <a:fld id="{48A87A34-81AB-432B-8DAE-1953F412C126}" type="datetimeFigureOut">
               <a:rPr lang="en-US" dirty="0"/>
-              <a:t>3/1/2016</a:t>
+              <a:t>3/2/2016</a:t>
             </a:fld>
             <a:endParaRPr lang="en-US" dirty="0"/>
           </a:p>
@@ -4848,7 +4848,7 @@
           <a:p>
             <a:fld id="{48A87A34-81AB-432B-8DAE-1953F412C126}" type="datetimeFigureOut">
               <a:rPr lang="en-US" dirty="0"/>
-              <a:t>3/1/2016</a:t>
+              <a:t>3/2/2016</a:t>
             </a:fld>
             <a:endParaRPr lang="en-US" dirty="0"/>
           </a:p>
@@ -5106,7 +5106,7 @@
           <a:p>
             <a:fld id="{48A87A34-81AB-432B-8DAE-1953F412C126}" type="datetimeFigureOut">
               <a:rPr lang="en-US" dirty="0"/>
-              <a:t>3/1/2016</a:t>
+              <a:t>3/2/2016</a:t>
             </a:fld>
             <a:endParaRPr lang="en-US" dirty="0"/>
           </a:p>
@@ -5535,7 +5535,7 @@
           <a:p>
             <a:fld id="{48A87A34-81AB-432B-8DAE-1953F412C126}" type="datetimeFigureOut">
               <a:rPr lang="en-US" dirty="0"/>
-              <a:t>3/1/2016</a:t>
+              <a:t>3/2/2016</a:t>
             </a:fld>
             <a:endParaRPr lang="en-US" dirty="0"/>
           </a:p>
@@ -6076,7 +6076,7 @@
           <a:p>
             <a:fld id="{48A87A34-81AB-432B-8DAE-1953F412C126}" type="datetimeFigureOut">
               <a:rPr lang="en-US" dirty="0"/>
-              <a:t>3/1/2016</a:t>
+              <a:t>3/2/2016</a:t>
             </a:fld>
             <a:endParaRPr lang="en-US" dirty="0"/>
           </a:p>
@@ -6791,7 +6791,7 @@
           <a:p>
             <a:fld id="{48A87A34-81AB-432B-8DAE-1953F412C126}" type="datetimeFigureOut">
               <a:rPr lang="en-US" dirty="0"/>
-              <a:t>3/1/2016</a:t>
+              <a:t>3/2/2016</a:t>
             </a:fld>
             <a:endParaRPr lang="en-US" dirty="0"/>
           </a:p>
@@ -6956,7 +6956,7 @@
           <a:p>
             <a:fld id="{48A87A34-81AB-432B-8DAE-1953F412C126}" type="datetimeFigureOut">
               <a:rPr lang="en-US" dirty="0"/>
-              <a:t>3/1/2016</a:t>
+              <a:t>3/2/2016</a:t>
             </a:fld>
             <a:endParaRPr lang="en-US" dirty="0"/>
           </a:p>
@@ -7131,7 +7131,7 @@
           <a:p>
             <a:fld id="{48A87A34-81AB-432B-8DAE-1953F412C126}" type="datetimeFigureOut">
               <a:rPr lang="en-US" dirty="0"/>
-              <a:t>3/1/2016</a:t>
+              <a:t>3/2/2016</a:t>
             </a:fld>
             <a:endParaRPr lang="en-US" dirty="0"/>
           </a:p>
@@ -7296,7 +7296,7 @@
           <a:p>
             <a:fld id="{48A87A34-81AB-432B-8DAE-1953F412C126}" type="datetimeFigureOut">
               <a:rPr lang="en-US" dirty="0"/>
-              <a:t>3/1/2016</a:t>
+              <a:t>3/2/2016</a:t>
             </a:fld>
             <a:endParaRPr lang="en-US" dirty="0"/>
           </a:p>
@@ -7541,7 +7541,7 @@
           <a:p>
             <a:fld id="{48A87A34-81AB-432B-8DAE-1953F412C126}" type="datetimeFigureOut">
               <a:rPr lang="en-US" dirty="0"/>
-              <a:t>3/1/2016</a:t>
+              <a:t>3/2/2016</a:t>
             </a:fld>
             <a:endParaRPr lang="en-US" dirty="0"/>
           </a:p>
@@ -7768,7 +7768,7 @@
           <a:p>
             <a:fld id="{48A87A34-81AB-432B-8DAE-1953F412C126}" type="datetimeFigureOut">
               <a:rPr lang="en-US" dirty="0"/>
-              <a:t>3/1/2016</a:t>
+              <a:t>3/2/2016</a:t>
             </a:fld>
             <a:endParaRPr lang="en-US" dirty="0"/>
           </a:p>
@@ -8144,7 +8144,7 @@
           <a:p>
             <a:fld id="{48A87A34-81AB-432B-8DAE-1953F412C126}" type="datetimeFigureOut">
               <a:rPr lang="en-US" dirty="0"/>
-              <a:t>3/1/2016</a:t>
+              <a:t>3/2/2016</a:t>
             </a:fld>
             <a:endParaRPr lang="en-US" dirty="0"/>
           </a:p>
@@ -8257,7 +8257,7 @@
           <a:p>
             <a:fld id="{48A87A34-81AB-432B-8DAE-1953F412C126}" type="datetimeFigureOut">
               <a:rPr lang="en-US" dirty="0"/>
-              <a:t>3/1/2016</a:t>
+              <a:t>3/2/2016</a:t>
             </a:fld>
             <a:endParaRPr lang="en-US" dirty="0"/>
           </a:p>
@@ -8347,7 +8347,7 @@
           <a:p>
             <a:fld id="{48A87A34-81AB-432B-8DAE-1953F412C126}" type="datetimeFigureOut">
               <a:rPr lang="en-US" dirty="0"/>
-              <a:t>3/1/2016</a:t>
+              <a:t>3/2/2016</a:t>
             </a:fld>
             <a:endParaRPr lang="en-US" dirty="0"/>
           </a:p>
@@ -8591,7 +8591,7 @@
           <a:p>
             <a:fld id="{48A87A34-81AB-432B-8DAE-1953F412C126}" type="datetimeFigureOut">
               <a:rPr lang="en-US" dirty="0"/>
-              <a:t>3/1/2016</a:t>
+              <a:t>3/2/2016</a:t>
             </a:fld>
             <a:endParaRPr lang="en-US" dirty="0"/>
           </a:p>
@@ -8866,7 +8866,7 @@
           <a:p>
             <a:fld id="{48A87A34-81AB-432B-8DAE-1953F412C126}" type="datetimeFigureOut">
               <a:rPr lang="en-US" dirty="0"/>
-              <a:t>3/1/2016</a:t>
+              <a:t>3/2/2016</a:t>
             </a:fld>
             <a:endParaRPr lang="en-US" dirty="0"/>
           </a:p>
@@ -11939,7 +11939,7 @@
             <a:fld id="{48A87A34-81AB-432B-8DAE-1953F412C126}" type="datetimeFigureOut">
               <a:rPr lang="en-US" dirty="0"/>
               <a:pPr/>
-              <a:t>3/1/2016</a:t>
+              <a:t>3/2/2016</a:t>
             </a:fld>
             <a:endParaRPr lang="en-US" dirty="0"/>
           </a:p>
@@ -12528,25 +12528,48 @@
           <a:p>
             <a:r>
               <a:rPr lang="en-US" dirty="0" smtClean="0"/>
-              <a:t>Webpage with persistent user information</a:t>
-            </a:r>
-          </a:p>
-          <a:p>
+              <a:t>Technical Requirements</a:t>
+            </a:r>
+          </a:p>
+          <a:p>
+            <a:pPr lvl="1"/>
             <a:r>
               <a:rPr lang="en-US" dirty="0" smtClean="0"/>
-              <a:t>User notification via email</a:t>
-            </a:r>
-          </a:p>
-          <a:p>
+              <a:t>Webpage with persistent user information (Austin)</a:t>
+            </a:r>
+          </a:p>
+          <a:p>
+            <a:pPr lvl="1"/>
             <a:r>
               <a:rPr lang="en-US" dirty="0" smtClean="0"/>
-              <a:t>Calendar widget with user scheduled events and details</a:t>
-            </a:r>
-          </a:p>
-          <a:p>
+              <a:t>User notification via email (Demetri)</a:t>
+            </a:r>
+          </a:p>
+          <a:p>
+            <a:pPr lvl="1"/>
             <a:r>
               <a:rPr lang="en-US" dirty="0" smtClean="0"/>
-              <a:t>Ability to calculate proximity based on address (map API)</a:t>
+              <a:t>Calendar widget with user scheduled events and details (Matt)</a:t>
+            </a:r>
+          </a:p>
+          <a:p>
+            <a:pPr lvl="1"/>
+            <a:r>
+              <a:rPr lang="en-US" dirty="0" smtClean="0"/>
+              <a:t>Ability to calculate proximity based on address (map API) (Matt)</a:t>
+            </a:r>
+          </a:p>
+          <a:p>
+            <a:r>
+              <a:rPr lang="en-US" dirty="0" smtClean="0"/>
+              <a:t>Nontechnical hurdle</a:t>
+            </a:r>
+          </a:p>
+          <a:p>
+            <a:pPr lvl="1"/>
+            <a:r>
+              <a:rPr lang="en-US" dirty="0" smtClean="0"/>
+              <a:t>Recruiting enough users to make system viable</a:t>
             </a:r>
           </a:p>
           <a:p>
@@ -12816,6 +12839,189 @@
                       </p:childTnLst>
                     </p:cTn>
                   </p:par>
+                  <p:par>
+                    <p:cTn id="23" fill="hold">
+                      <p:stCondLst>
+                        <p:cond delay="indefinite"/>
+                      </p:stCondLst>
+                      <p:childTnLst>
+                        <p:par>
+                          <p:cTn id="24" fill="hold">
+                            <p:stCondLst>
+                              <p:cond delay="0"/>
+                            </p:stCondLst>
+                            <p:childTnLst>
+                              <p:par>
+                                <p:cTn id="25" presetID="22" presetClass="entr" presetSubtype="4" fill="hold" nodeType="clickEffect">
+                                  <p:stCondLst>
+                                    <p:cond delay="0"/>
+                                  </p:stCondLst>
+                                  <p:childTnLst>
+                                    <p:set>
+                                      <p:cBhvr>
+                                        <p:cTn id="26" dur="1" fill="hold">
+                                          <p:stCondLst>
+                                            <p:cond delay="0"/>
+                                          </p:stCondLst>
+                                        </p:cTn>
+                                        <p:tgtEl>
+                                          <p:spTgt spid="3">
+                                            <p:txEl>
+                                              <p:pRg st="4" end="4"/>
+                                            </p:txEl>
+                                          </p:spTgt>
+                                        </p:tgtEl>
+                                        <p:attrNameLst>
+                                          <p:attrName>style.visibility</p:attrName>
+                                        </p:attrNameLst>
+                                      </p:cBhvr>
+                                      <p:to>
+                                        <p:strVal val="visible"/>
+                                      </p:to>
+                                    </p:set>
+                                    <p:animEffect transition="in" filter="wipe(down)">
+                                      <p:cBhvr>
+                                        <p:cTn id="27" dur="500"/>
+                                        <p:tgtEl>
+                                          <p:spTgt spid="3">
+                                            <p:txEl>
+                                              <p:pRg st="4" end="4"/>
+                                            </p:txEl>
+                                          </p:spTgt>
+                                        </p:tgtEl>
+                                      </p:cBhvr>
+                                    </p:animEffect>
+                                  </p:childTnLst>
+                                </p:cTn>
+                              </p:par>
+                            </p:childTnLst>
+                          </p:cTn>
+                        </p:par>
+                      </p:childTnLst>
+                    </p:cTn>
+                  </p:par>
+                  <p:par>
+                    <p:cTn id="28" fill="hold">
+                      <p:stCondLst>
+                        <p:cond delay="indefinite"/>
+                      </p:stCondLst>
+                      <p:childTnLst>
+                        <p:par>
+                          <p:cTn id="29" fill="hold">
+                            <p:stCondLst>
+                              <p:cond delay="0"/>
+                            </p:stCondLst>
+                            <p:childTnLst>
+                              <p:par>
+                                <p:cTn id="30" presetID="22" presetClass="entr" presetSubtype="4" fill="hold" nodeType="clickEffect">
+                                  <p:stCondLst>
+                                    <p:cond delay="0"/>
+                                  </p:stCondLst>
+                                  <p:childTnLst>
+                                    <p:set>
+                                      <p:cBhvr>
+                                        <p:cTn id="31" dur="1" fill="hold">
+                                          <p:stCondLst>
+                                            <p:cond delay="0"/>
+                                          </p:stCondLst>
+                                        </p:cTn>
+                                        <p:tgtEl>
+                                          <p:spTgt spid="3">
+                                            <p:txEl>
+                                              <p:pRg st="5" end="5"/>
+                                            </p:txEl>
+                                          </p:spTgt>
+                                        </p:tgtEl>
+                                        <p:attrNameLst>
+                                          <p:attrName>style.visibility</p:attrName>
+                                        </p:attrNameLst>
+                                      </p:cBhvr>
+                                      <p:to>
+                                        <p:strVal val="visible"/>
+                                      </p:to>
+                                    </p:set>
+                                    <p:animEffect transition="in" filter="wipe(down)">
+                                      <p:cBhvr>
+                                        <p:cTn id="32" dur="500"/>
+                                        <p:tgtEl>
+                                          <p:spTgt spid="3">
+                                            <p:txEl>
+                                              <p:pRg st="5" end="5"/>
+                                            </p:txEl>
+                                          </p:spTgt>
+                                        </p:tgtEl>
+                                      </p:cBhvr>
+                                    </p:animEffect>
+                                  </p:childTnLst>
+                                </p:cTn>
+                              </p:par>
+                            </p:childTnLst>
+                          </p:cTn>
+                        </p:par>
+                      </p:childTnLst>
+                    </p:cTn>
+                  </p:par>
+                  <p:par>
+                    <p:cTn id="33" fill="hold">
+                      <p:stCondLst>
+                        <p:cond delay="indefinite"/>
+                      </p:stCondLst>
+                      <p:childTnLst>
+                        <p:par>
+                          <p:cTn id="34" fill="hold">
+                            <p:stCondLst>
+                              <p:cond delay="0"/>
+                            </p:stCondLst>
+                            <p:childTnLst>
+                              <p:par>
+                                <p:cTn id="35" presetID="22" presetClass="entr" presetSubtype="4" fill="hold" nodeType="clickEffect">
+                                  <p:stCondLst>
+                                    <p:cond delay="0"/>
+                                  </p:stCondLst>
+                                  <p:childTnLst>
+                                    <p:set>
+                                      <p:cBhvr>
+                                        <p:cTn id="36" dur="1" fill="hold">
+                                          <p:stCondLst>
+                                            <p:cond delay="0"/>
+                                          </p:stCondLst>
+                                        </p:cTn>
+                                        <p:tgtEl>
+                                          <p:spTgt spid="3">
+                                            <p:txEl>
+                                              <p:pRg st="6" end="6"/>
+                                            </p:txEl>
+                                          </p:spTgt>
+                                        </p:tgtEl>
+                                        <p:attrNameLst>
+                                          <p:attrName>style.visibility</p:attrName>
+                                        </p:attrNameLst>
+                                      </p:cBhvr>
+                                      <p:to>
+                                        <p:strVal val="visible"/>
+                                      </p:to>
+                                    </p:set>
+                                    <p:animEffect transition="in" filter="wipe(down)">
+                                      <p:cBhvr>
+                                        <p:cTn id="37" dur="500"/>
+                                        <p:tgtEl>
+                                          <p:spTgt spid="3">
+                                            <p:txEl>
+                                              <p:pRg st="6" end="6"/>
+                                            </p:txEl>
+                                          </p:spTgt>
+                                        </p:tgtEl>
+                                      </p:cBhvr>
+                                    </p:animEffect>
+                                  </p:childTnLst>
+                                </p:cTn>
+                              </p:par>
+                            </p:childTnLst>
+                          </p:cTn>
+                        </p:par>
+                      </p:childTnLst>
+                    </p:cTn>
+                  </p:par>
                 </p:childTnLst>
               </p:cTn>
               <p:prevCondLst>
@@ -12842,216 +13048,6 @@
 </file>
 
 <file path=ppt/slides/slide3.xml><?xml version="1.0" encoding="utf-8"?>
-<p:sld xmlns:a="http://schemas.openxmlformats.org/drawingml/2006/main" xmlns:r="http://schemas.openxmlformats.org/officeDocument/2006/relationships" xmlns:p="http://schemas.openxmlformats.org/presentationml/2006/main">
-  <p:cSld>
-    <p:spTree>
-      <p:nvGrpSpPr>
-        <p:cNvPr id="1" name=""/>
-        <p:cNvGrpSpPr/>
-        <p:nvPr/>
-      </p:nvGrpSpPr>
-      <p:grpSpPr>
-        <a:xfrm>
-          <a:off x="0" y="0"/>
-          <a:ext cx="0" cy="0"/>
-          <a:chOff x="0" y="0"/>
-          <a:chExt cx="0" cy="0"/>
-        </a:xfrm>
-      </p:grpSpPr>
-      <p:sp>
-        <p:nvSpPr>
-          <p:cNvPr id="2" name="Title 1"/>
-          <p:cNvSpPr>
-            <a:spLocks noGrp="1"/>
-          </p:cNvSpPr>
-          <p:nvPr>
-            <p:ph type="title"/>
-          </p:nvPr>
-        </p:nvSpPr>
-        <p:spPr/>
-        <p:txBody>
-          <a:bodyPr/>
-          <a:lstStyle/>
-          <a:p>
-            <a:r>
-              <a:rPr lang="en-US" dirty="0" smtClean="0"/>
-              <a:t>Team Roles</a:t>
-            </a:r>
-            <a:endParaRPr lang="en-US" dirty="0"/>
-          </a:p>
-        </p:txBody>
-      </p:sp>
-      <p:sp>
-        <p:nvSpPr>
-          <p:cNvPr id="3" name="Content Placeholder 2"/>
-          <p:cNvSpPr>
-            <a:spLocks noGrp="1"/>
-          </p:cNvSpPr>
-          <p:nvPr>
-            <p:ph idx="1"/>
-          </p:nvPr>
-        </p:nvSpPr>
-        <p:spPr/>
-        <p:txBody>
-          <a:bodyPr/>
-          <a:lstStyle/>
-          <a:p>
-            <a:r>
-              <a:rPr lang="en-US" dirty="0" smtClean="0"/>
-              <a:t>Austin – Main page development</a:t>
-            </a:r>
-          </a:p>
-          <a:p>
-            <a:r>
-              <a:rPr lang="en-US" dirty="0" smtClean="0"/>
-              <a:t>Demetri – Email notification integration</a:t>
-            </a:r>
-          </a:p>
-          <a:p>
-            <a:r>
-              <a:rPr lang="en-US" dirty="0" smtClean="0"/>
-              <a:t>Matt – Calendar integration and distance calculation</a:t>
-            </a:r>
-            <a:endParaRPr lang="en-US" dirty="0"/>
-          </a:p>
-        </p:txBody>
-      </p:sp>
-    </p:spTree>
-    <p:extLst>
-      <p:ext uri="{BB962C8B-B14F-4D97-AF65-F5344CB8AC3E}">
-        <p14:creationId xmlns:p14="http://schemas.microsoft.com/office/powerpoint/2010/main" val="3588783588"/>
-      </p:ext>
-    </p:extLst>
-  </p:cSld>
-  <p:clrMapOvr>
-    <a:masterClrMapping/>
-  </p:clrMapOvr>
-  <p:timing>
-    <p:tnLst>
-      <p:par>
-        <p:cTn id="1" dur="indefinite" restart="never" nodeType="tmRoot"/>
-      </p:par>
-    </p:tnLst>
-  </p:timing>
-</p:sld>
-</file>
-
-<file path=ppt/slides/slide4.xml><?xml version="1.0" encoding="utf-8"?>
-<p:sld xmlns:a="http://schemas.openxmlformats.org/drawingml/2006/main" xmlns:r="http://schemas.openxmlformats.org/officeDocument/2006/relationships" xmlns:p="http://schemas.openxmlformats.org/presentationml/2006/main">
-  <p:cSld>
-    <p:spTree>
-      <p:nvGrpSpPr>
-        <p:cNvPr id="1" name=""/>
-        <p:cNvGrpSpPr/>
-        <p:nvPr/>
-      </p:nvGrpSpPr>
-      <p:grpSpPr>
-        <a:xfrm>
-          <a:off x="0" y="0"/>
-          <a:ext cx="0" cy="0"/>
-          <a:chOff x="0" y="0"/>
-          <a:chExt cx="0" cy="0"/>
-        </a:xfrm>
-      </p:grpSpPr>
-      <p:sp>
-        <p:nvSpPr>
-          <p:cNvPr id="2" name="Title 1"/>
-          <p:cNvSpPr>
-            <a:spLocks noGrp="1"/>
-          </p:cNvSpPr>
-          <p:nvPr>
-            <p:ph type="ctrTitle"/>
-          </p:nvPr>
-        </p:nvSpPr>
-        <p:spPr/>
-        <p:txBody>
-          <a:bodyPr/>
-          <a:lstStyle/>
-          <a:p>
-            <a:r>
-              <a:rPr lang="en-US" dirty="0" smtClean="0">
-                <a:effectLst>
-                  <a:outerShdw blurRad="38100" dist="38100" dir="2700000" algn="tl">
-                    <a:srgbClr val="000000">
-                      <a:alpha val="43137"/>
-                    </a:srgbClr>
-                  </a:outerShdw>
-                </a:effectLst>
-              </a:rPr>
-              <a:t>Market Study</a:t>
-            </a:r>
-            <a:endParaRPr lang="en-US" dirty="0">
-              <a:effectLst>
-                <a:outerShdw blurRad="38100" dist="38100" dir="2700000" algn="tl">
-                  <a:srgbClr val="000000">
-                    <a:alpha val="43137"/>
-                  </a:srgbClr>
-                </a:outerShdw>
-              </a:effectLst>
-            </a:endParaRPr>
-          </a:p>
-        </p:txBody>
-      </p:sp>
-      <p:sp>
-        <p:nvSpPr>
-          <p:cNvPr id="3" name="Subtitle 2"/>
-          <p:cNvSpPr>
-            <a:spLocks noGrp="1"/>
-          </p:cNvSpPr>
-          <p:nvPr>
-            <p:ph type="subTitle" idx="1"/>
-          </p:nvPr>
-        </p:nvSpPr>
-        <p:spPr/>
-        <p:txBody>
-          <a:bodyPr/>
-          <a:lstStyle/>
-          <a:p>
-            <a:r>
-              <a:rPr lang="en-US" dirty="0" smtClean="0">
-                <a:effectLst>
-                  <a:outerShdw blurRad="38100" dist="38100" dir="2700000" algn="tl">
-                    <a:srgbClr val="000000">
-                      <a:alpha val="43137"/>
-                    </a:srgbClr>
-                  </a:outerShdw>
-                </a:effectLst>
-              </a:rPr>
-              <a:t>Let the exploitation begin…</a:t>
-            </a:r>
-            <a:endParaRPr lang="en-US" dirty="0">
-              <a:effectLst>
-                <a:outerShdw blurRad="38100" dist="38100" dir="2700000" algn="tl">
-                  <a:srgbClr val="000000">
-                    <a:alpha val="43137"/>
-                  </a:srgbClr>
-                </a:outerShdw>
-              </a:effectLst>
-            </a:endParaRPr>
-          </a:p>
-        </p:txBody>
-      </p:sp>
-    </p:spTree>
-    <p:extLst>
-      <p:ext uri="{BB962C8B-B14F-4D97-AF65-F5344CB8AC3E}">
-        <p14:creationId xmlns:p14="http://schemas.microsoft.com/office/powerpoint/2010/main" val="2592307627"/>
-      </p:ext>
-    </p:extLst>
-  </p:cSld>
-  <p:clrMapOvr>
-    <a:masterClrMapping/>
-  </p:clrMapOvr>
-  <p:timing>
-    <p:tnLst>
-      <p:par>
-        <p:cTn id="1" dur="indefinite" restart="never" nodeType="tmRoot"/>
-      </p:par>
-    </p:tnLst>
-  </p:timing>
-</p:sld>
-</file>
-
-<file path=ppt/slides/slide5.xml><?xml version="1.0" encoding="utf-8"?>
 <p:sld xmlns:a="http://schemas.openxmlformats.org/drawingml/2006/main" xmlns:r="http://schemas.openxmlformats.org/officeDocument/2006/relationships" xmlns:p="http://schemas.openxmlformats.org/presentationml/2006/main">
   <p:cSld>
     <p:spTree>
@@ -13276,6 +13272,502 @@
 </p:sld>
 </file>
 
+<file path=ppt/slides/slide4.xml><?xml version="1.0" encoding="utf-8"?>
+<p:sld xmlns:a="http://schemas.openxmlformats.org/drawingml/2006/main" xmlns:r="http://schemas.openxmlformats.org/officeDocument/2006/relationships" xmlns:p="http://schemas.openxmlformats.org/presentationml/2006/main">
+  <p:cSld>
+    <p:spTree>
+      <p:nvGrpSpPr>
+        <p:cNvPr id="1" name=""/>
+        <p:cNvGrpSpPr/>
+        <p:nvPr/>
+      </p:nvGrpSpPr>
+      <p:grpSpPr>
+        <a:xfrm>
+          <a:off x="0" y="0"/>
+          <a:ext cx="0" cy="0"/>
+          <a:chOff x="0" y="0"/>
+          <a:chExt cx="0" cy="0"/>
+        </a:xfrm>
+      </p:grpSpPr>
+      <p:sp>
+        <p:nvSpPr>
+          <p:cNvPr id="2" name="Title 1"/>
+          <p:cNvSpPr>
+            <a:spLocks noGrp="1"/>
+          </p:cNvSpPr>
+          <p:nvPr>
+            <p:ph type="title"/>
+          </p:nvPr>
+        </p:nvSpPr>
+        <p:spPr>
+          <a:xfrm>
+            <a:off x="1141412" y="770917"/>
+            <a:ext cx="9905998" cy="1478570"/>
+          </a:xfrm>
+        </p:spPr>
+        <p:txBody>
+          <a:bodyPr/>
+          <a:lstStyle/>
+          <a:p>
+            <a:r>
+              <a:rPr lang="en-US" dirty="0"/>
+              <a:t>USER INTERFACE: Home PAGE</a:t>
+            </a:r>
+          </a:p>
+        </p:txBody>
+      </p:sp>
+      <p:sp>
+        <p:nvSpPr>
+          <p:cNvPr id="3" name="Content Placeholder 2"/>
+          <p:cNvSpPr>
+            <a:spLocks noGrp="1"/>
+          </p:cNvSpPr>
+          <p:nvPr>
+            <p:ph idx="1"/>
+          </p:nvPr>
+        </p:nvSpPr>
+        <p:spPr/>
+        <p:txBody>
+          <a:bodyPr/>
+          <a:lstStyle/>
+          <a:p>
+            <a:pPr marL="0" indent="0">
+              <a:buNone/>
+            </a:pPr>
+            <a:r>
+              <a:rPr lang="en-US" dirty="0"/>
+              <a:t>LOGIN PAGE / REGISTER TO BE A USER </a:t>
+            </a:r>
+          </a:p>
+          <a:p>
+            <a:r>
+              <a:rPr lang="en-US" dirty="0"/>
+              <a:t>AFTER INITIAL LOGIN</a:t>
+            </a:r>
+          </a:p>
+          <a:p>
+            <a:pPr lvl="1"/>
+            <a:r>
+              <a:rPr lang="en-US" dirty="0">
+                <a:solidFill>
+                  <a:prstClr val="white"/>
+                </a:solidFill>
+              </a:rPr>
+              <a:t>SELECT TO BE A DRIVER OR RIDER </a:t>
+            </a:r>
+          </a:p>
+          <a:p>
+            <a:pPr lvl="1"/>
+            <a:r>
+              <a:rPr lang="en-US" dirty="0">
+                <a:solidFill>
+                  <a:prstClr val="white"/>
+                </a:solidFill>
+              </a:rPr>
+              <a:t>INPUT CURRENT LOCATION </a:t>
+            </a:r>
+          </a:p>
+          <a:p>
+            <a:pPr lvl="1"/>
+            <a:r>
+              <a:rPr lang="en-US" dirty="0">
+                <a:solidFill>
+                  <a:prstClr val="white"/>
+                </a:solidFill>
+              </a:rPr>
+              <a:t>EDIT PROFILE </a:t>
+            </a:r>
+          </a:p>
+          <a:p>
+            <a:pPr marL="914400" lvl="2" indent="0">
+              <a:buNone/>
+            </a:pPr>
+            <a:endParaRPr lang="en-US" dirty="0"/>
+          </a:p>
+        </p:txBody>
+      </p:sp>
+    </p:spTree>
+    <p:extLst>
+      <p:ext uri="{BB962C8B-B14F-4D97-AF65-F5344CB8AC3E}">
+        <p14:creationId xmlns:p14="http://schemas.microsoft.com/office/powerpoint/2010/main" val="4024558830"/>
+      </p:ext>
+    </p:extLst>
+  </p:cSld>
+  <p:clrMapOvr>
+    <a:masterClrMapping/>
+  </p:clrMapOvr>
+</p:sld>
+</file>
+
+<file path=ppt/slides/slide5.xml><?xml version="1.0" encoding="utf-8"?>
+<p:sld xmlns:a="http://schemas.openxmlformats.org/drawingml/2006/main" xmlns:r="http://schemas.openxmlformats.org/officeDocument/2006/relationships" xmlns:p="http://schemas.openxmlformats.org/presentationml/2006/main">
+  <p:cSld>
+    <p:spTree>
+      <p:nvGrpSpPr>
+        <p:cNvPr id="1" name=""/>
+        <p:cNvGrpSpPr/>
+        <p:nvPr/>
+      </p:nvGrpSpPr>
+      <p:grpSpPr>
+        <a:xfrm>
+          <a:off x="0" y="0"/>
+          <a:ext cx="0" cy="0"/>
+          <a:chOff x="0" y="0"/>
+          <a:chExt cx="0" cy="0"/>
+        </a:xfrm>
+      </p:grpSpPr>
+      <p:sp>
+        <p:nvSpPr>
+          <p:cNvPr id="2" name="Title 1"/>
+          <p:cNvSpPr>
+            <a:spLocks noGrp="1"/>
+          </p:cNvSpPr>
+          <p:nvPr>
+            <p:ph type="title"/>
+          </p:nvPr>
+        </p:nvSpPr>
+        <p:spPr/>
+        <p:txBody>
+          <a:bodyPr/>
+          <a:lstStyle/>
+          <a:p>
+            <a:r>
+              <a:rPr lang="en-US" dirty="0"/>
+              <a:t>USER INTERFACE: Main Activity </a:t>
+            </a:r>
+          </a:p>
+        </p:txBody>
+      </p:sp>
+      <p:sp>
+        <p:nvSpPr>
+          <p:cNvPr id="3" name="Content Placeholder 2"/>
+          <p:cNvSpPr>
+            <a:spLocks noGrp="1"/>
+          </p:cNvSpPr>
+          <p:nvPr>
+            <p:ph idx="1"/>
+          </p:nvPr>
+        </p:nvSpPr>
+        <p:spPr>
+          <a:xfrm>
+            <a:off x="1141413" y="1577340"/>
+            <a:ext cx="4482148" cy="4213861"/>
+          </a:xfrm>
+        </p:spPr>
+        <p:txBody>
+          <a:bodyPr/>
+          <a:lstStyle/>
+          <a:p>
+            <a:pPr marL="457200" lvl="1" indent="0">
+              <a:buNone/>
+            </a:pPr>
+            <a:r>
+              <a:rPr lang="en-US" dirty="0">
+                <a:solidFill>
+                  <a:prstClr val="white"/>
+                </a:solidFill>
+              </a:rPr>
+              <a:t>DRIVERS</a:t>
+            </a:r>
+          </a:p>
+          <a:p>
+            <a:pPr lvl="1"/>
+            <a:r>
+              <a:rPr lang="en-US" dirty="0">
+                <a:solidFill>
+                  <a:prstClr val="white"/>
+                </a:solidFill>
+              </a:rPr>
+              <a:t>INPUT YOUR TRAVEL ROUTE</a:t>
+            </a:r>
+          </a:p>
+          <a:p>
+            <a:pPr lvl="1"/>
+            <a:r>
+              <a:rPr lang="en-US" dirty="0">
+                <a:solidFill>
+                  <a:prstClr val="white"/>
+                </a:solidFill>
+              </a:rPr>
+              <a:t>ACCEPT RIDE REQUEST</a:t>
+            </a:r>
+          </a:p>
+          <a:p>
+            <a:pPr lvl="1"/>
+            <a:r>
+              <a:rPr lang="en-US" dirty="0">
+                <a:solidFill>
+                  <a:prstClr val="white"/>
+                </a:solidFill>
+              </a:rPr>
+              <a:t>DENY RIDE REQUEST</a:t>
+            </a:r>
+          </a:p>
+          <a:p>
+            <a:pPr lvl="1"/>
+            <a:endParaRPr lang="en-US" dirty="0">
+              <a:solidFill>
+                <a:prstClr val="white"/>
+              </a:solidFill>
+            </a:endParaRPr>
+          </a:p>
+        </p:txBody>
+      </p:sp>
+      <p:sp>
+        <p:nvSpPr>
+          <p:cNvPr id="4" name="Content Placeholder 2"/>
+          <p:cNvSpPr txBox="1">
+            <a:spLocks/>
+          </p:cNvSpPr>
+          <p:nvPr/>
+        </p:nvSpPr>
+        <p:spPr>
+          <a:xfrm>
+            <a:off x="5623561" y="1577340"/>
+            <a:ext cx="4482148" cy="4213861"/>
+          </a:xfrm>
+          <a:prstGeom prst="rect">
+            <a:avLst/>
+          </a:prstGeom>
+        </p:spPr>
+        <p:txBody>
+          <a:bodyPr vert="horz" lIns="91440" tIns="45720" rIns="91440" bIns="45720" rtlCol="0">
+            <a:normAutofit/>
+          </a:bodyPr>
+          <a:lstStyle>
+            <a:lvl1pPr marL="228600" indent="-228600" algn="l" defTabSz="914400" rtl="0" eaLnBrk="1" latinLnBrk="0" hangingPunct="1">
+              <a:lnSpc>
+                <a:spcPct val="120000"/>
+              </a:lnSpc>
+              <a:spcBef>
+                <a:spcPts val="1000"/>
+              </a:spcBef>
+              <a:buSzPct val="125000"/>
+              <a:buFont typeface="Arial" panose="020B0604020202020204" pitchFamily="34" charset="0"/>
+              <a:buChar char="•"/>
+              <a:defRPr sz="2400" kern="1200">
+                <a:solidFill>
+                  <a:schemeClr val="tx1"/>
+                </a:solidFill>
+                <a:latin typeface="+mn-lt"/>
+                <a:ea typeface="+mn-ea"/>
+                <a:cs typeface="+mn-cs"/>
+              </a:defRPr>
+            </a:lvl1pPr>
+            <a:lvl2pPr marL="685800" indent="-228600" algn="l" defTabSz="914400" rtl="0" eaLnBrk="1" latinLnBrk="0" hangingPunct="1">
+              <a:lnSpc>
+                <a:spcPct val="120000"/>
+              </a:lnSpc>
+              <a:spcBef>
+                <a:spcPts val="500"/>
+              </a:spcBef>
+              <a:buSzPct val="125000"/>
+              <a:buFont typeface="Arial" panose="020B0604020202020204" pitchFamily="34" charset="0"/>
+              <a:buChar char="•"/>
+              <a:defRPr sz="2000" kern="1200">
+                <a:solidFill>
+                  <a:schemeClr val="tx1"/>
+                </a:solidFill>
+                <a:latin typeface="+mn-lt"/>
+                <a:ea typeface="+mn-ea"/>
+                <a:cs typeface="+mn-cs"/>
+              </a:defRPr>
+            </a:lvl2pPr>
+            <a:lvl3pPr marL="1143000" indent="-228600" algn="l" defTabSz="914400" rtl="0" eaLnBrk="1" latinLnBrk="0" hangingPunct="1">
+              <a:lnSpc>
+                <a:spcPct val="120000"/>
+              </a:lnSpc>
+              <a:spcBef>
+                <a:spcPts val="500"/>
+              </a:spcBef>
+              <a:buSzPct val="125000"/>
+              <a:buFont typeface="Arial" panose="020B0604020202020204" pitchFamily="34" charset="0"/>
+              <a:buChar char="•"/>
+              <a:defRPr sz="1800" kern="1200">
+                <a:solidFill>
+                  <a:schemeClr val="tx1"/>
+                </a:solidFill>
+                <a:latin typeface="+mn-lt"/>
+                <a:ea typeface="+mn-ea"/>
+                <a:cs typeface="+mn-cs"/>
+              </a:defRPr>
+            </a:lvl3pPr>
+            <a:lvl4pPr marL="1600200" indent="-228600" algn="l" defTabSz="914400" rtl="0" eaLnBrk="1" latinLnBrk="0" hangingPunct="1">
+              <a:lnSpc>
+                <a:spcPct val="120000"/>
+              </a:lnSpc>
+              <a:spcBef>
+                <a:spcPts val="500"/>
+              </a:spcBef>
+              <a:buSzPct val="125000"/>
+              <a:buFont typeface="Arial" panose="020B0604020202020204" pitchFamily="34" charset="0"/>
+              <a:buChar char="•"/>
+              <a:defRPr sz="1600" kern="1200">
+                <a:solidFill>
+                  <a:schemeClr val="tx1"/>
+                </a:solidFill>
+                <a:latin typeface="+mn-lt"/>
+                <a:ea typeface="+mn-ea"/>
+                <a:cs typeface="+mn-cs"/>
+              </a:defRPr>
+            </a:lvl4pPr>
+            <a:lvl5pPr marL="2057400" indent="-228600" algn="l" defTabSz="914400" rtl="0" eaLnBrk="1" latinLnBrk="0" hangingPunct="1">
+              <a:lnSpc>
+                <a:spcPct val="120000"/>
+              </a:lnSpc>
+              <a:spcBef>
+                <a:spcPts val="500"/>
+              </a:spcBef>
+              <a:buSzPct val="125000"/>
+              <a:buFont typeface="Arial" panose="020B0604020202020204" pitchFamily="34" charset="0"/>
+              <a:buChar char="•"/>
+              <a:defRPr sz="1600" kern="1200">
+                <a:solidFill>
+                  <a:schemeClr val="tx1"/>
+                </a:solidFill>
+                <a:latin typeface="+mn-lt"/>
+                <a:ea typeface="+mn-ea"/>
+                <a:cs typeface="+mn-cs"/>
+              </a:defRPr>
+            </a:lvl5pPr>
+            <a:lvl6pPr marL="2514600" indent="-228600" algn="l" defTabSz="914400" rtl="0" eaLnBrk="1" latinLnBrk="0" hangingPunct="1">
+              <a:lnSpc>
+                <a:spcPct val="120000"/>
+              </a:lnSpc>
+              <a:spcBef>
+                <a:spcPts val="500"/>
+              </a:spcBef>
+              <a:buSzPct val="125000"/>
+              <a:buFont typeface="Arial" panose="020B0604020202020204" pitchFamily="34" charset="0"/>
+              <a:buChar char="•"/>
+              <a:defRPr sz="1400" kern="1200">
+                <a:solidFill>
+                  <a:schemeClr val="tx1"/>
+                </a:solidFill>
+                <a:latin typeface="+mn-lt"/>
+                <a:ea typeface="+mn-ea"/>
+                <a:cs typeface="+mn-cs"/>
+              </a:defRPr>
+            </a:lvl6pPr>
+            <a:lvl7pPr marL="2971800" indent="-228600" algn="l" defTabSz="914400" rtl="0" eaLnBrk="1" latinLnBrk="0" hangingPunct="1">
+              <a:lnSpc>
+                <a:spcPct val="120000"/>
+              </a:lnSpc>
+              <a:spcBef>
+                <a:spcPts val="500"/>
+              </a:spcBef>
+              <a:buSzPct val="125000"/>
+              <a:buFont typeface="Arial" panose="020B0604020202020204" pitchFamily="34" charset="0"/>
+              <a:buChar char="•"/>
+              <a:defRPr sz="1400" kern="1200">
+                <a:solidFill>
+                  <a:schemeClr val="tx1"/>
+                </a:solidFill>
+                <a:latin typeface="+mn-lt"/>
+                <a:ea typeface="+mn-ea"/>
+                <a:cs typeface="+mn-cs"/>
+              </a:defRPr>
+            </a:lvl7pPr>
+            <a:lvl8pPr marL="3429000" indent="-228600" algn="l" defTabSz="914400" rtl="0" eaLnBrk="1" latinLnBrk="0" hangingPunct="1">
+              <a:lnSpc>
+                <a:spcPct val="120000"/>
+              </a:lnSpc>
+              <a:spcBef>
+                <a:spcPts val="500"/>
+              </a:spcBef>
+              <a:buSzPct val="125000"/>
+              <a:buFont typeface="Arial" panose="020B0604020202020204" pitchFamily="34" charset="0"/>
+              <a:buChar char="•"/>
+              <a:defRPr sz="1400" kern="1200">
+                <a:solidFill>
+                  <a:schemeClr val="tx1"/>
+                </a:solidFill>
+                <a:latin typeface="+mn-lt"/>
+                <a:ea typeface="+mn-ea"/>
+                <a:cs typeface="+mn-cs"/>
+              </a:defRPr>
+            </a:lvl8pPr>
+            <a:lvl9pPr marL="3886200" indent="-228600" algn="l" defTabSz="914400" rtl="0" eaLnBrk="1" latinLnBrk="0" hangingPunct="1">
+              <a:lnSpc>
+                <a:spcPct val="120000"/>
+              </a:lnSpc>
+              <a:spcBef>
+                <a:spcPts val="500"/>
+              </a:spcBef>
+              <a:buSzPct val="125000"/>
+              <a:buFont typeface="Arial" panose="020B0604020202020204" pitchFamily="34" charset="0"/>
+              <a:buChar char="•"/>
+              <a:defRPr sz="1400" kern="1200">
+                <a:solidFill>
+                  <a:schemeClr val="tx1"/>
+                </a:solidFill>
+                <a:latin typeface="+mn-lt"/>
+                <a:ea typeface="+mn-ea"/>
+                <a:cs typeface="+mn-cs"/>
+              </a:defRPr>
+            </a:lvl9pPr>
+          </a:lstStyle>
+          <a:p>
+            <a:pPr marL="457200" lvl="1" indent="0">
+              <a:buNone/>
+            </a:pPr>
+            <a:r>
+              <a:rPr lang="en-US" dirty="0">
+                <a:solidFill>
+                  <a:prstClr val="white"/>
+                </a:solidFill>
+              </a:rPr>
+              <a:t>RIDERS</a:t>
+            </a:r>
+          </a:p>
+          <a:p>
+            <a:pPr lvl="1"/>
+            <a:r>
+              <a:rPr lang="en-US" dirty="0">
+                <a:solidFill>
+                  <a:prstClr val="white"/>
+                </a:solidFill>
+              </a:rPr>
+              <a:t>REQUEST RIDES </a:t>
+            </a:r>
+          </a:p>
+          <a:p>
+            <a:pPr lvl="1"/>
+            <a:r>
+              <a:rPr lang="en-US" dirty="0">
+                <a:solidFill>
+                  <a:prstClr val="white"/>
+                </a:solidFill>
+              </a:rPr>
+              <a:t>SEE AVALAIBLE DRIVERS</a:t>
+            </a:r>
+          </a:p>
+          <a:p>
+            <a:pPr lvl="1"/>
+            <a:r>
+              <a:rPr lang="en-US" dirty="0">
+                <a:solidFill>
+                  <a:prstClr val="white"/>
+                </a:solidFill>
+              </a:rPr>
+              <a:t>CONTACT DRIVERS</a:t>
+            </a:r>
+          </a:p>
+        </p:txBody>
+      </p:sp>
+    </p:spTree>
+    <p:extLst>
+      <p:ext uri="{BB962C8B-B14F-4D97-AF65-F5344CB8AC3E}">
+        <p14:creationId xmlns:p14="http://schemas.microsoft.com/office/powerpoint/2010/main" val="3206081470"/>
+      </p:ext>
+    </p:extLst>
+  </p:cSld>
+  <p:clrMapOvr>
+    <a:masterClrMapping/>
+  </p:clrMapOvr>
+</p:sld>
+</file>
+
 <file path=ppt/slides/slide6.xml><?xml version="1.0" encoding="utf-8"?>
 <p:sld xmlns:a="http://schemas.openxmlformats.org/drawingml/2006/main" xmlns:r="http://schemas.openxmlformats.org/officeDocument/2006/relationships" xmlns:p="http://schemas.openxmlformats.org/presentationml/2006/main">
   <p:cSld>
@@ -13309,6 +13801,95 @@
           <a:lstStyle/>
           <a:p>
             <a:r>
+              <a:rPr lang="en-US" dirty="0" smtClean="0"/>
+              <a:t>Data Model</a:t>
+            </a:r>
+            <a:endParaRPr lang="en-US" dirty="0"/>
+          </a:p>
+        </p:txBody>
+      </p:sp>
+      <p:pic>
+        <p:nvPicPr>
+          <p:cNvPr id="6" name="Content Placeholder 5"/>
+          <p:cNvPicPr>
+            <a:picLocks noGrp="1" noChangeAspect="1"/>
+          </p:cNvPicPr>
+          <p:nvPr>
+            <p:ph idx="1"/>
+          </p:nvPr>
+        </p:nvPicPr>
+        <p:blipFill>
+          <a:blip r:embed="rId2">
+            <a:extLst>
+              <a:ext uri="{28A0092B-C50C-407E-A947-70E740481C1C}">
+                <a14:useLocalDpi xmlns:a14="http://schemas.microsoft.com/office/drawing/2010/main" val="0"/>
+              </a:ext>
+            </a:extLst>
+          </a:blip>
+          <a:stretch>
+            <a:fillRect/>
+          </a:stretch>
+        </p:blipFill>
+        <p:spPr>
+          <a:xfrm>
+            <a:off x="3715890" y="1158846"/>
+            <a:ext cx="5100875" cy="4575464"/>
+          </a:xfrm>
+        </p:spPr>
+      </p:pic>
+    </p:spTree>
+    <p:extLst>
+      <p:ext uri="{BB962C8B-B14F-4D97-AF65-F5344CB8AC3E}">
+        <p14:creationId xmlns:p14="http://schemas.microsoft.com/office/powerpoint/2010/main" val="2656655324"/>
+      </p:ext>
+    </p:extLst>
+  </p:cSld>
+  <p:clrMapOvr>
+    <a:masterClrMapping/>
+  </p:clrMapOvr>
+  <p:timing>
+    <p:tnLst>
+      <p:par>
+        <p:cTn id="1" dur="indefinite" restart="never" nodeType="tmRoot"/>
+      </p:par>
+    </p:tnLst>
+  </p:timing>
+</p:sld>
+</file>
+
+<file path=ppt/slides/slide7.xml><?xml version="1.0" encoding="utf-8"?>
+<p:sld xmlns:a="http://schemas.openxmlformats.org/drawingml/2006/main" xmlns:r="http://schemas.openxmlformats.org/officeDocument/2006/relationships" xmlns:p="http://schemas.openxmlformats.org/presentationml/2006/main">
+  <p:cSld>
+    <p:spTree>
+      <p:nvGrpSpPr>
+        <p:cNvPr id="1" name=""/>
+        <p:cNvGrpSpPr/>
+        <p:nvPr/>
+      </p:nvGrpSpPr>
+      <p:grpSpPr>
+        <a:xfrm>
+          <a:off x="0" y="0"/>
+          <a:ext cx="0" cy="0"/>
+          <a:chOff x="0" y="0"/>
+          <a:chExt cx="0" cy="0"/>
+        </a:xfrm>
+      </p:grpSpPr>
+      <p:sp>
+        <p:nvSpPr>
+          <p:cNvPr id="2" name="Title 1"/>
+          <p:cNvSpPr>
+            <a:spLocks noGrp="1"/>
+          </p:cNvSpPr>
+          <p:nvPr>
+            <p:ph type="title"/>
+          </p:nvPr>
+        </p:nvSpPr>
+        <p:spPr/>
+        <p:txBody>
+          <a:bodyPr/>
+          <a:lstStyle/>
+          <a:p>
+            <a:r>
               <a:rPr lang="en-US" dirty="0" err="1" smtClean="0">
                 <a:effectLst>
                   <a:outerShdw blurRad="38100" dist="38100" dir="2700000" algn="tl">
@@ -13495,7 +14076,7 @@
                   </a:outerShdw>
                 </a:effectLst>
               </a:rPr>
-              <a:t>ride“</a:t>
+              <a:t>ride”</a:t>
             </a:r>
           </a:p>
           <a:p>
@@ -13576,7 +14157,7 @@
 </p:sld>
 </file>
 
-<file path=ppt/slides/slide7.xml><?xml version="1.0" encoding="utf-8"?>
+<file path=ppt/slides/slide8.xml><?xml version="1.0" encoding="utf-8"?>
 <p:sld xmlns:a="http://schemas.openxmlformats.org/drawingml/2006/main" xmlns:r="http://schemas.openxmlformats.org/officeDocument/2006/relationships" xmlns:p="http://schemas.openxmlformats.org/presentationml/2006/main">
   <p:cSld>
     <p:spTree>
@@ -13970,95 +14551,6 @@
     <p:extLst>
       <p:ext uri="{BB962C8B-B14F-4D97-AF65-F5344CB8AC3E}">
         <p14:creationId xmlns:p14="http://schemas.microsoft.com/office/powerpoint/2010/main" val="1777097541"/>
-      </p:ext>
-    </p:extLst>
-  </p:cSld>
-  <p:clrMapOvr>
-    <a:masterClrMapping/>
-  </p:clrMapOvr>
-  <p:timing>
-    <p:tnLst>
-      <p:par>
-        <p:cTn id="1" dur="indefinite" restart="never" nodeType="tmRoot"/>
-      </p:par>
-    </p:tnLst>
-  </p:timing>
-</p:sld>
-</file>
-
-<file path=ppt/slides/slide8.xml><?xml version="1.0" encoding="utf-8"?>
-<p:sld xmlns:a="http://schemas.openxmlformats.org/drawingml/2006/main" xmlns:r="http://schemas.openxmlformats.org/officeDocument/2006/relationships" xmlns:p="http://schemas.openxmlformats.org/presentationml/2006/main">
-  <p:cSld>
-    <p:spTree>
-      <p:nvGrpSpPr>
-        <p:cNvPr id="1" name=""/>
-        <p:cNvGrpSpPr/>
-        <p:nvPr/>
-      </p:nvGrpSpPr>
-      <p:grpSpPr>
-        <a:xfrm>
-          <a:off x="0" y="0"/>
-          <a:ext cx="0" cy="0"/>
-          <a:chOff x="0" y="0"/>
-          <a:chExt cx="0" cy="0"/>
-        </a:xfrm>
-      </p:grpSpPr>
-      <p:sp>
-        <p:nvSpPr>
-          <p:cNvPr id="2" name="Title 1"/>
-          <p:cNvSpPr>
-            <a:spLocks noGrp="1"/>
-          </p:cNvSpPr>
-          <p:nvPr>
-            <p:ph type="title"/>
-          </p:nvPr>
-        </p:nvSpPr>
-        <p:spPr/>
-        <p:txBody>
-          <a:bodyPr/>
-          <a:lstStyle/>
-          <a:p>
-            <a:r>
-              <a:rPr lang="en-US" dirty="0" smtClean="0"/>
-              <a:t>Data Model</a:t>
-            </a:r>
-            <a:endParaRPr lang="en-US" dirty="0"/>
-          </a:p>
-        </p:txBody>
-      </p:sp>
-      <p:pic>
-        <p:nvPicPr>
-          <p:cNvPr id="6" name="Content Placeholder 5"/>
-          <p:cNvPicPr>
-            <a:picLocks noGrp="1" noChangeAspect="1"/>
-          </p:cNvPicPr>
-          <p:nvPr>
-            <p:ph idx="1"/>
-          </p:nvPr>
-        </p:nvPicPr>
-        <p:blipFill>
-          <a:blip r:embed="rId2">
-            <a:extLst>
-              <a:ext uri="{28A0092B-C50C-407E-A947-70E740481C1C}">
-                <a14:useLocalDpi xmlns:a14="http://schemas.microsoft.com/office/drawing/2010/main" val="0"/>
-              </a:ext>
-            </a:extLst>
-          </a:blip>
-          <a:stretch>
-            <a:fillRect/>
-          </a:stretch>
-        </p:blipFill>
-        <p:spPr>
-          <a:xfrm>
-            <a:off x="3715890" y="1158846"/>
-            <a:ext cx="5100875" cy="4575464"/>
-          </a:xfrm>
-        </p:spPr>
-      </p:pic>
-    </p:spTree>
-    <p:extLst>
-      <p:ext uri="{BB962C8B-B14F-4D97-AF65-F5344CB8AC3E}">
-        <p14:creationId xmlns:p14="http://schemas.microsoft.com/office/powerpoint/2010/main" val="2656655324"/>
       </p:ext>
     </p:extLst>
   </p:cSld>

</xml_diff>